<commit_message>
[add] un petit push depuis un ptit moment mdr
</commit_message>
<xml_diff>
--- a/Templates/goldman sachs fci.pptx
+++ b/Templates/goldman sachs fci.pptx
@@ -900,7 +900,7 @@
           <a:p>
             <a:fld id="{515CCE07-1711-4DC7-A7D8-7ED312C82FB8}" type="datetimeFigureOut">
               <a:rPr lang="fr-FR" smtClean="0"/>
-              <a:t>31/05/2022</a:t>
+              <a:t>01/06/2022</a:t>
             </a:fld>
             <a:endParaRPr lang="fr-FR"/>
           </a:p>
@@ -1065,7 +1065,7 @@
           <a:p>
             <a:fld id="{014ABEAC-8B63-4BD1-9569-A14EB8752A94}" type="datetimeFigureOut">
               <a:rPr lang="fr-FR" smtClean="0"/>
-              <a:t>31/05/2022</a:t>
+              <a:t>01/06/2022</a:t>
             </a:fld>
             <a:endParaRPr lang="fr-FR"/>
           </a:p>
@@ -2665,17 +2665,22 @@
                 </a:solidFill>
                 <a:latin typeface="Futura PT" panose="020B0902020204020203" pitchFamily="34" charset="0"/>
               </a:rPr>
-              <a:t>Durée d’investissement conseillée : </a:t>
-            </a:r>
-            <a:r>
-              <a:rPr lang="fr-FR" sz="800" b="1" dirty="0"/>
-              <a:t>&lt;DIC&gt;</a:t>
+              <a:t>Durée d’investissement conseillée :</a:t>
+            </a:r>
+            <a:r>
+              <a:rPr lang="fr-FR" sz="800" cap="none" dirty="0">
+                <a:solidFill>
+                  <a:schemeClr val="tx2"/>
+                </a:solidFill>
+              </a:rPr>
+              <a:t> &lt;DIC&gt;</a:t>
             </a:r>
             <a:r>
               <a:rPr lang="fr-FR" sz="800" b="1" dirty="0">
                 <a:solidFill>
                   <a:srgbClr val="B9A049"/>
                 </a:solidFill>
+                <a:latin typeface="Futura PT" panose="020B0902020204020203" pitchFamily="34" charset="0"/>
               </a:rPr>
               <a:t> </a:t>
             </a:r>
@@ -19546,7 +19551,7 @@
               <a:t>Les termes « capital » et « capital initial » utilisés dans cette brochure désignent la Valeur Nominale des titres de créance « Millesime Juillet 2022 » soit 1000 EUR. Le montant remboursé est brut hors frais et fiscalité applicable au cadre d’investissement. Les Taux de Rendement Annuel (« TRA ») sont nets de frais de gestion pour les contrats d’assurance vie/capitalisation ou net de droits de garde en compte-titres (en prenant comme hypothèse un taux de frais de gestion ou de droits de garde de 1,00% annuel), mais sans prise en compte des autres frais, de la fiscalité et prélèvements sociaux applicables au cadre d’investissement. Ils sont calculés pour un investissement entre la </a:t>
             </a:r>
             <a:r>
-              <a:rPr lang="fr-FR" sz="800">
+              <a:rPr lang="fr-FR" sz="800" dirty="0">
                 <a:solidFill>
                   <a:schemeClr val="tx1"/>
                 </a:solidFill>
@@ -19555,7 +19560,7 @@
               <a:t>&lt;DDCI_M_B_STRIKE&gt; </a:t>
             </a:r>
             <a:r>
-              <a:rPr kumimoji="0" lang="fr-FR" sz="800" b="0" i="0" u="none" strike="noStrike" kern="1200" cap="none" spc="0" normalizeH="0" baseline="0" noProof="0">
+              <a:rPr kumimoji="0" lang="fr-FR" sz="800" b="0" i="0" u="none" strike="noStrike" kern="1200" cap="none" spc="0" normalizeH="0" baseline="0" noProof="0" dirty="0">
                 <a:ln>
                   <a:noFill/>
                 </a:ln>
@@ -19569,24 +19574,7 @@
                 <a:ea typeface="+mn-ea"/>
                 <a:cs typeface="+mn-cs"/>
               </a:rPr>
-              <a:t>date </a:t>
-            </a:r>
-            <a:r>
-              <a:rPr kumimoji="0" lang="fr-FR" sz="800" b="0" i="0" u="none" strike="noStrike" kern="1200" cap="none" spc="0" normalizeH="0" baseline="0" noProof="0" dirty="0">
-                <a:ln>
-                  <a:noFill/>
-                </a:ln>
-                <a:solidFill>
-                  <a:schemeClr val="tx1"/>
-                </a:solidFill>
-                <a:effectLst/>
-                <a:uLnTx/>
-                <a:uFillTx/>
-                <a:latin typeface="Proxima Nova Rg"/>
-                <a:ea typeface="+mn-ea"/>
-                <a:cs typeface="+mn-cs"/>
-              </a:rPr>
-              <a:t>de constatation initiale</a:t>
+              <a:t>date de constatation initiale</a:t>
             </a:r>
             <a:r>
               <a:rPr lang="fr-FR" sz="800" baseline="30000" dirty="0">
@@ -20351,7 +20339,41 @@
                 <a:ea typeface="+mn-ea"/>
                 <a:cs typeface="+mn-cs"/>
               </a:rPr>
-              <a:t>Le gain est plafonné </a:t>
+              <a:t>Le &lt;</a:t>
+            </a:r>
+            <a:r>
+              <a:rPr kumimoji="0" lang="fr-FR" sz="800" b="1" i="0" u="none" strike="noStrike" kern="1200" cap="none" spc="0" normalizeH="0" baseline="0" noProof="0" dirty="0" err="1">
+                <a:ln>
+                  <a:noFill/>
+                </a:ln>
+                <a:solidFill>
+                  <a:schemeClr val="tx1"/>
+                </a:solidFill>
+                <a:effectLst/>
+                <a:uLnTx/>
+                <a:uFillTx/>
+                <a:latin typeface="Proxima Nova Rg"/>
+                <a:ea typeface="+mn-ea"/>
+                <a:cs typeface="+mn-cs"/>
+              </a:rPr>
+              <a:t>GainOuCoupon</a:t>
+            </a:r>
+            <a:r>
+              <a:rPr kumimoji="0" lang="fr-FR" sz="800" b="1" i="0" u="none" strike="noStrike" kern="1200" cap="none" spc="0" normalizeH="0" baseline="0" noProof="0" dirty="0">
+                <a:ln>
+                  <a:noFill/>
+                </a:ln>
+                <a:solidFill>
+                  <a:schemeClr val="tx1"/>
+                </a:solidFill>
+                <a:effectLst/>
+                <a:uLnTx/>
+                <a:uFillTx/>
+                <a:latin typeface="Proxima Nova Rg"/>
+                <a:ea typeface="+mn-ea"/>
+                <a:cs typeface="+mn-cs"/>
+              </a:rPr>
+              <a:t>&gt; est plafonné </a:t>
             </a:r>
             <a:r>
               <a:rPr kumimoji="0" lang="fr-FR" sz="800" b="0" i="0" u="none" strike="noStrike" kern="1200" cap="none" spc="0" normalizeH="0" baseline="0" noProof="0" dirty="0">
@@ -29149,8 +29171,8 @@
         </p:nvSpPr>
         <p:spPr>
           <a:xfrm>
-            <a:off x="1028701" y="2418954"/>
-            <a:ext cx="5483168" cy="460502"/>
+            <a:off x="1028701" y="2365614"/>
+            <a:ext cx="5483168" cy="548640"/>
           </a:xfrm>
           <a:prstGeom prst="rect">
             <a:avLst/>
@@ -30980,7 +31002,7 @@
                   <a:schemeClr val="tx2"/>
                 </a:solidFill>
               </a:rPr>
-              <a:t>clôture à un &lt;SJR3&gt; supérieur ou égal à &lt;BFP&gt; de son &lt;NDR&gt;, l’investisseur reçoit, le &lt;DEC&gt;</a:t>
+              <a:t>clôture à un &lt;SJR3&gt; supérieur ou égal à &lt;BFP&gt; de son &lt;NDR&gt;, l’investisseur reçoit, le &lt;DEC_MAJ&gt;</a:t>
             </a:r>
             <a:r>
               <a:rPr lang="fr-FR" sz="800" b="1" baseline="30000" dirty="0">
@@ -31016,7 +31038,7 @@
         <p:spPr>
           <a:xfrm>
             <a:off x="763483" y="8154339"/>
-            <a:ext cx="6073677" cy="123111"/>
+            <a:ext cx="6073677" cy="246221"/>
           </a:xfrm>
           <a:prstGeom prst="rect">
             <a:avLst/>
@@ -31060,7 +31082,7 @@
                   <a:schemeClr val="tx2"/>
                 </a:solidFill>
               </a:rPr>
-              <a:t>clôture à un &lt;SJR3&gt; strictement inférieur à &lt;PDI&gt; de son &lt;SJR3&gt; de Référence, l’investisseur reçoit, le &lt;DEC&gt;</a:t>
+              <a:t>clôture à un &lt;SJR3&gt; strictement inférieur à &lt;PDI&gt; de son &lt;SJR3&gt; de Référence, l’investisseur reçoit, le &lt;DEC_MAJ&gt;</a:t>
             </a:r>
           </a:p>
         </p:txBody>
@@ -31297,26 +31319,7 @@
                   <a:schemeClr val="tx2"/>
                 </a:solidFill>
               </a:rPr>
-              <a:t>&lt;N</a:t>
-            </a:r>
-            <a:r>
-              <a:rPr lang="fr-FR" sz="800" dirty="0">
-                <a:solidFill>
-                  <a:schemeClr val="tx2"/>
-                </a:solidFill>
-                <a:highlight>
-                  <a:srgbClr val="FF00FF"/>
-                </a:highlight>
-              </a:rPr>
-              <a:t>DR</a:t>
-            </a:r>
-            <a:r>
-              <a:rPr lang="fr-FR" sz="800" dirty="0">
-                <a:solidFill>
-                  <a:schemeClr val="tx2"/>
-                </a:solidFill>
-              </a:rPr>
-              <a:t>&gt; </a:t>
+              <a:t>&lt;NDR&gt; </a:t>
             </a:r>
             <a:r>
               <a:rPr lang="fr-FR" sz="800" dirty="0"/>
@@ -31608,7 +31611,7 @@
                   <a:srgbClr val="000000"/>
                 </a:solidFill>
               </a:rPr>
-              <a:t>clôture à un &lt;SJR3&gt; strictement inférieur à &lt;BFP&gt; mais supérieur ou égal à &lt;PDI&gt; de son &lt;NDR&gt;, l’investisseur reçoit, le &lt;DEC&gt; : </a:t>
+              <a:t>clôture à un &lt;SJR3&gt; strictement inférieur à &lt;BFP&gt; mais supérieur ou égal à &lt;PDI&gt; de son &lt;NDR&gt;, l’investisseur reçoit, le &lt;DEC_MAJ&gt; : </a:t>
             </a:r>
           </a:p>
         </p:txBody>
@@ -32158,7 +32161,7 @@
         </p:nvSpPr>
         <p:spPr>
           <a:xfrm>
-            <a:off x="458460" y="1492210"/>
+            <a:off x="458460" y="1377910"/>
             <a:ext cx="6741375" cy="123111"/>
           </a:xfrm>
           <a:prstGeom prst="rect">
@@ -33707,7 +33710,7 @@
         </p:nvSpPr>
         <p:spPr>
           <a:xfrm>
-            <a:off x="458460" y="1314410"/>
+            <a:off x="458460" y="1276310"/>
             <a:ext cx="6741375" cy="123111"/>
           </a:xfrm>
           <a:prstGeom prst="rect">
@@ -34236,16 +34239,12 @@
               <a:t>, &lt;SJR1&gt; clôture à un &lt;SJR3&gt; strictement inférieur à </a:t>
             </a:r>
             <a:r>
-              <a:rPr lang="fr-FR" sz="800" dirty="0">
-                <a:highlight>
-                  <a:srgbClr val="FF00FF"/>
-                </a:highlight>
-              </a:rPr>
-              <a:t>&lt;ABAC2&gt;. </a:t>
+              <a:rPr lang="fr-FR" sz="800"/>
+              <a:t>&lt;ABAC2&gt;. Le </a:t>
             </a:r>
             <a:r>
               <a:rPr lang="fr-FR" sz="800" dirty="0"/>
-              <a:t>Le mécanisme de remboursement anticipé automatique n’est donc pas activé et le produit ne verse aucun coupon&lt;Mémoire4&gt;.</a:t>
+              <a:t>mécanisme de remboursement anticipé automatique n’est donc pas activé et le produit ne verse aucun coupon&lt;Mémoire4&gt;.</a:t>
             </a:r>
           </a:p>
           <a:p>
@@ -35736,6 +35735,18 @@
 </file>
 
 <file path=customXml/item1.xml><?xml version="1.0" encoding="utf-8"?>
+<p:properties xmlns:p="http://schemas.microsoft.com/office/2006/metadata/properties" xmlns:xsi="http://www.w3.org/2001/XMLSchema-instance" xmlns:pc="http://schemas.microsoft.com/office/infopath/2007/PartnerControls">
+  <documentManagement>
+    <_Flow_SignoffStatus xmlns="ef624bc2-1644-4d69-8362-5c28ca496374" xsi:nil="true"/>
+    <TaxCatchAll xmlns="514a554b-82b0-4359-b247-fc84018a95f0" xsi:nil="true"/>
+    <lcf76f155ced4ddcb4097134ff3c332f xmlns="ef624bc2-1644-4d69-8362-5c28ca496374">
+      <Terms xmlns="http://schemas.microsoft.com/office/infopath/2007/PartnerControls"/>
+    </lcf76f155ced4ddcb4097134ff3c332f>
+  </documentManagement>
+</p:properties>
+</file>
+
+<file path=customXml/item2.xml><?xml version="1.0" encoding="utf-8"?>
 <ct:contentTypeSchema xmlns:ct="http://schemas.microsoft.com/office/2006/metadata/contentType" xmlns:ma="http://schemas.microsoft.com/office/2006/metadata/properties/metaAttributes" ct:_="" ma:_="" ma:contentTypeName="Document" ma:contentTypeID="0x0101005DDE610BC516E448BB8152259F39635A" ma:contentTypeVersion="16" ma:contentTypeDescription="Crée un document." ma:contentTypeScope="" ma:versionID="83520913e4fb50886b69c5d2b42e4a4a">
   <xsd:schema xmlns:xsd="http://www.w3.org/2001/XMLSchema" xmlns:xs="http://www.w3.org/2001/XMLSchema" xmlns:p="http://schemas.microsoft.com/office/2006/metadata/properties" xmlns:ns2="ef624bc2-1644-4d69-8362-5c28ca496374" xmlns:ns3="514a554b-82b0-4359-b247-fc84018a95f0" targetNamespace="http://schemas.microsoft.com/office/2006/metadata/properties" ma:root="true" ma:fieldsID="cc61d48d89f522401cef424d48066f4d" ns2:_="" ns3:_="">
     <xsd:import namespace="ef624bc2-1644-4d69-8362-5c28ca496374"/>
@@ -35978,18 +35989,6 @@
 </ct:contentTypeSchema>
 </file>
 
-<file path=customXml/item2.xml><?xml version="1.0" encoding="utf-8"?>
-<p:properties xmlns:p="http://schemas.microsoft.com/office/2006/metadata/properties" xmlns:xsi="http://www.w3.org/2001/XMLSchema-instance" xmlns:pc="http://schemas.microsoft.com/office/infopath/2007/PartnerControls">
-  <documentManagement>
-    <_Flow_SignoffStatus xmlns="ef624bc2-1644-4d69-8362-5c28ca496374" xsi:nil="true"/>
-    <TaxCatchAll xmlns="514a554b-82b0-4359-b247-fc84018a95f0" xsi:nil="true"/>
-    <lcf76f155ced4ddcb4097134ff3c332f xmlns="ef624bc2-1644-4d69-8362-5c28ca496374">
-      <Terms xmlns="http://schemas.microsoft.com/office/infopath/2007/PartnerControls"/>
-    </lcf76f155ced4ddcb4097134ff3c332f>
-  </documentManagement>
-</p:properties>
-</file>
-
 <file path=customXml/item3.xml><?xml version="1.0" encoding="utf-8"?>
 <?mso-contentType ?>
 <FormTemplates xmlns="http://schemas.microsoft.com/sharepoint/v3/contenttype/forms">
@@ -36000,6 +35999,23 @@
 </file>
 
 <file path=customXml/itemProps1.xml><?xml version="1.0" encoding="utf-8"?>
+<ds:datastoreItem xmlns:ds="http://schemas.openxmlformats.org/officeDocument/2006/customXml" ds:itemID="{25DE574B-2CD2-4078-9BEA-2A14717D9698}">
+  <ds:schemaRefs>
+    <ds:schemaRef ds:uri="514a554b-82b0-4359-b247-fc84018a95f0"/>
+    <ds:schemaRef ds:uri="ef624bc2-1644-4d69-8362-5c28ca496374"/>
+    <ds:schemaRef ds:uri="http://purl.org/dc/dcmitype/"/>
+    <ds:schemaRef ds:uri="http://purl.org/dc/elements/1.1/"/>
+    <ds:schemaRef ds:uri="http://purl.org/dc/terms/"/>
+    <ds:schemaRef ds:uri="http://schemas.microsoft.com/office/2006/documentManagement/types"/>
+    <ds:schemaRef ds:uri="http://schemas.microsoft.com/office/2006/metadata/properties"/>
+    <ds:schemaRef ds:uri="http://schemas.microsoft.com/office/infopath/2007/PartnerControls"/>
+    <ds:schemaRef ds:uri="http://schemas.openxmlformats.org/package/2006/metadata/core-properties"/>
+    <ds:schemaRef ds:uri="http://www.w3.org/XML/1998/namespace"/>
+  </ds:schemaRefs>
+</ds:datastoreItem>
+</file>
+
+<file path=customXml/itemProps2.xml><?xml version="1.0" encoding="utf-8"?>
 <ds:datastoreItem xmlns:ds="http://schemas.openxmlformats.org/officeDocument/2006/customXml" ds:itemID="{23AC6951-ED9C-45BC-A071-9CAFF45B5627}">
   <ds:schemaRefs>
     <ds:schemaRef ds:uri="http://schemas.microsoft.com/office/2006/metadata/contentType"/>
@@ -36018,23 +36034,6 @@
 </ds:datastoreItem>
 </file>
 
-<file path=customXml/itemProps2.xml><?xml version="1.0" encoding="utf-8"?>
-<ds:datastoreItem xmlns:ds="http://schemas.openxmlformats.org/officeDocument/2006/customXml" ds:itemID="{25DE574B-2CD2-4078-9BEA-2A14717D9698}">
-  <ds:schemaRefs>
-    <ds:schemaRef ds:uri="514a554b-82b0-4359-b247-fc84018a95f0"/>
-    <ds:schemaRef ds:uri="ef624bc2-1644-4d69-8362-5c28ca496374"/>
-    <ds:schemaRef ds:uri="http://purl.org/dc/dcmitype/"/>
-    <ds:schemaRef ds:uri="http://purl.org/dc/elements/1.1/"/>
-    <ds:schemaRef ds:uri="http://purl.org/dc/terms/"/>
-    <ds:schemaRef ds:uri="http://schemas.microsoft.com/office/2006/documentManagement/types"/>
-    <ds:schemaRef ds:uri="http://schemas.microsoft.com/office/2006/metadata/properties"/>
-    <ds:schemaRef ds:uri="http://schemas.microsoft.com/office/infopath/2007/PartnerControls"/>
-    <ds:schemaRef ds:uri="http://schemas.openxmlformats.org/package/2006/metadata/core-properties"/>
-    <ds:schemaRef ds:uri="http://www.w3.org/XML/1998/namespace"/>
-  </ds:schemaRefs>
-</ds:datastoreItem>
-</file>
-
 <file path=customXml/itemProps3.xml><?xml version="1.0" encoding="utf-8"?>
 <ds:datastoreItem xmlns:ds="http://schemas.openxmlformats.org/officeDocument/2006/customXml" ds:itemID="{B00FC41E-FBDE-42E2-B58A-20EBD240A376}">
   <ds:schemaRefs>

</xml_diff>